<commit_message>
initial update to presentation
</commit_message>
<xml_diff>
--- a/course-assets/presentations/intro.pptx
+++ b/course-assets/presentations/intro.pptx
@@ -166,45 +166,6 @@
 <file path=ppt/changesInfos/changesInfo1.xml><?xml version="1.0" encoding="utf-8"?>
 <pc:chgInfo xmlns:a="http://schemas.openxmlformats.org/drawingml/2006/main" xmlns:r="http://schemas.openxmlformats.org/officeDocument/2006/relationships" xmlns:ac="http://schemas.microsoft.com/office/drawing/2013/main/command" xmlns:pc="http://schemas.microsoft.com/office/powerpoint/2013/main/command">
   <pc:docChgLst>
-    <pc:chgData name="Wendi Fan" userId="S::wendi.fan@softwire.com::aa43677a-bbe8-4ac0-bfc8-43838de03ab4" providerId="AD" clId="Web-{1AFC5FAA-D937-3F14-F412-45FE3D30AFD6}"/>
-    <pc:docChg chg="addSld delSld modSld">
-      <pc:chgData name="Wendi Fan" userId="S::wendi.fan@softwire.com::aa43677a-bbe8-4ac0-bfc8-43838de03ab4" providerId="AD" clId="Web-{1AFC5FAA-D937-3F14-F412-45FE3D30AFD6}" dt="2025-02-14T10:49:27.249" v="33"/>
-      <pc:docMkLst>
-        <pc:docMk/>
-      </pc:docMkLst>
-      <pc:sldChg chg="modSp del">
-        <pc:chgData name="Wendi Fan" userId="S::wendi.fan@softwire.com::aa43677a-bbe8-4ac0-bfc8-43838de03ab4" providerId="AD" clId="Web-{1AFC5FAA-D937-3F14-F412-45FE3D30AFD6}" dt="2025-02-14T10:49:27.249" v="33"/>
-        <pc:sldMkLst>
-          <pc:docMk/>
-          <pc:sldMk cId="1134830894" sldId="4535"/>
-        </pc:sldMkLst>
-      </pc:sldChg>
-      <pc:sldChg chg="delSp modSp add replId">
-        <pc:chgData name="Wendi Fan" userId="S::wendi.fan@softwire.com::aa43677a-bbe8-4ac0-bfc8-43838de03ab4" providerId="AD" clId="Web-{1AFC5FAA-D937-3F14-F412-45FE3D30AFD6}" dt="2025-02-14T10:49:17.905" v="32" actId="20577"/>
-        <pc:sldMkLst>
-          <pc:docMk/>
-          <pc:sldMk cId="432697297" sldId="4538"/>
-        </pc:sldMkLst>
-        <pc:spChg chg="mod">
-          <ac:chgData name="Wendi Fan" userId="S::wendi.fan@softwire.com::aa43677a-bbe8-4ac0-bfc8-43838de03ab4" providerId="AD" clId="Web-{1AFC5FAA-D937-3F14-F412-45FE3D30AFD6}" dt="2025-02-14T10:48:53.654" v="11" actId="14100"/>
-          <ac:spMkLst>
-            <pc:docMk/>
-            <pc:sldMk cId="432697297" sldId="4538"/>
-            <ac:spMk id="2" creationId="{64B437F8-00B7-C485-01E4-5DA3430EAA29}"/>
-          </ac:spMkLst>
-        </pc:spChg>
-        <pc:spChg chg="mod">
-          <ac:chgData name="Wendi Fan" userId="S::wendi.fan@softwire.com::aa43677a-bbe8-4ac0-bfc8-43838de03ab4" providerId="AD" clId="Web-{1AFC5FAA-D937-3F14-F412-45FE3D30AFD6}" dt="2025-02-14T10:49:17.905" v="32" actId="20577"/>
-          <ac:spMkLst>
-            <pc:docMk/>
-            <pc:sldMk cId="432697297" sldId="4538"/>
-            <ac:spMk id="6" creationId="{023AE65F-D67E-8443-FB37-CFF5773DE671}"/>
-          </ac:spMkLst>
-        </pc:spChg>
-      </pc:sldChg>
-    </pc:docChg>
-  </pc:docChgLst>
-  <pc:docChgLst>
     <pc:chgData name="Wendi Fan" userId="S::wendi.fan@softwire.com::aa43677a-bbe8-4ac0-bfc8-43838de03ab4" providerId="AD" clId="Web-{997F4CA0-31C3-3461-53C9-704321DF8750}"/>
     <pc:docChg chg="modSld">
       <pc:chgData name="Wendi Fan" userId="S::wendi.fan@softwire.com::aa43677a-bbe8-4ac0-bfc8-43838de03ab4" providerId="AD" clId="Web-{997F4CA0-31C3-3461-53C9-704321DF8750}" dt="2025-02-14T12:53:32.258" v="447" actId="20577"/>
@@ -241,6 +202,45 @@
             <ac:picMk id="3" creationId="{61C86583-12C9-80C6-8B69-5C7EF9849F1F}"/>
           </ac:picMkLst>
         </pc:picChg>
+      </pc:sldChg>
+    </pc:docChg>
+  </pc:docChgLst>
+  <pc:docChgLst>
+    <pc:chgData name="Wendi Fan" userId="S::wendi.fan@softwire.com::aa43677a-bbe8-4ac0-bfc8-43838de03ab4" providerId="AD" clId="Web-{1AFC5FAA-D937-3F14-F412-45FE3D30AFD6}"/>
+    <pc:docChg chg="addSld delSld modSld">
+      <pc:chgData name="Wendi Fan" userId="S::wendi.fan@softwire.com::aa43677a-bbe8-4ac0-bfc8-43838de03ab4" providerId="AD" clId="Web-{1AFC5FAA-D937-3F14-F412-45FE3D30AFD6}" dt="2025-02-14T10:49:27.249" v="33"/>
+      <pc:docMkLst>
+        <pc:docMk/>
+      </pc:docMkLst>
+      <pc:sldChg chg="modSp del">
+        <pc:chgData name="Wendi Fan" userId="S::wendi.fan@softwire.com::aa43677a-bbe8-4ac0-bfc8-43838de03ab4" providerId="AD" clId="Web-{1AFC5FAA-D937-3F14-F412-45FE3D30AFD6}" dt="2025-02-14T10:49:27.249" v="33"/>
+        <pc:sldMkLst>
+          <pc:docMk/>
+          <pc:sldMk cId="1134830894" sldId="4535"/>
+        </pc:sldMkLst>
+      </pc:sldChg>
+      <pc:sldChg chg="delSp modSp add replId">
+        <pc:chgData name="Wendi Fan" userId="S::wendi.fan@softwire.com::aa43677a-bbe8-4ac0-bfc8-43838de03ab4" providerId="AD" clId="Web-{1AFC5FAA-D937-3F14-F412-45FE3D30AFD6}" dt="2025-02-14T10:49:17.905" v="32" actId="20577"/>
+        <pc:sldMkLst>
+          <pc:docMk/>
+          <pc:sldMk cId="432697297" sldId="4538"/>
+        </pc:sldMkLst>
+        <pc:spChg chg="mod">
+          <ac:chgData name="Wendi Fan" userId="S::wendi.fan@softwire.com::aa43677a-bbe8-4ac0-bfc8-43838de03ab4" providerId="AD" clId="Web-{1AFC5FAA-D937-3F14-F412-45FE3D30AFD6}" dt="2025-02-14T10:48:53.654" v="11" actId="14100"/>
+          <ac:spMkLst>
+            <pc:docMk/>
+            <pc:sldMk cId="432697297" sldId="4538"/>
+            <ac:spMk id="2" creationId="{64B437F8-00B7-C485-01E4-5DA3430EAA29}"/>
+          </ac:spMkLst>
+        </pc:spChg>
+        <pc:spChg chg="mod">
+          <ac:chgData name="Wendi Fan" userId="S::wendi.fan@softwire.com::aa43677a-bbe8-4ac0-bfc8-43838de03ab4" providerId="AD" clId="Web-{1AFC5FAA-D937-3F14-F412-45FE3D30AFD6}" dt="2025-02-14T10:49:17.905" v="32" actId="20577"/>
+          <ac:spMkLst>
+            <pc:docMk/>
+            <pc:sldMk cId="432697297" sldId="4538"/>
+            <ac:spMk id="6" creationId="{023AE65F-D67E-8443-FB37-CFF5773DE671}"/>
+          </ac:spMkLst>
+        </pc:spChg>
       </pc:sldChg>
     </pc:docChg>
   </pc:docChgLst>
@@ -767,7 +767,7 @@
           <a:p>
             <a:fld id="{78B2772D-67CF-446E-AB14-873D70346968}" type="datetimeFigureOut">
               <a:rPr lang="en-GB" smtClean="0"/>
-              <a:t>16/02/2025</a:t>
+              <a:t>24/10/2025</a:t>
             </a:fld>
             <a:endParaRPr lang="en-GB"/>
           </a:p>
@@ -3322,7 +3322,7 @@
           <a:p>
             <a:fld id="{6C25FA03-981D-3F4F-ABFD-F2CAE44CF4DF}" type="datetime1">
               <a:rPr lang="en-GB" smtClean="0"/>
-              <a:t>16/02/2025</a:t>
+              <a:t>24/10/2025</a:t>
             </a:fld>
             <a:endParaRPr lang="en-GB"/>
           </a:p>
@@ -3642,7 +3642,7 @@
           <a:p>
             <a:fld id="{AD447513-F0D7-9140-9852-9A843D8B81D3}" type="datetime1">
               <a:rPr lang="en-GB" smtClean="0"/>
-              <a:t>16/02/2025</a:t>
+              <a:t>24/10/2025</a:t>
             </a:fld>
             <a:endParaRPr lang="en-GB"/>
           </a:p>
@@ -4055,7 +4055,7 @@
           <a:p>
             <a:fld id="{4FC983D9-AEB3-884A-8B61-40B359253CCD}" type="datetime1">
               <a:rPr lang="en-GB" smtClean="0"/>
-              <a:t>16/02/2025</a:t>
+              <a:t>24/10/2025</a:t>
             </a:fld>
             <a:endParaRPr lang="en-GB"/>
           </a:p>
@@ -5090,7 +5090,7 @@
           <a:p>
             <a:fld id="{862EF5BF-54FA-BF48-B61D-2432192EF666}" type="datetime1">
               <a:rPr lang="en-GB" smtClean="0"/>
-              <a:t>16/02/2025</a:t>
+              <a:t>24/10/2025</a:t>
             </a:fld>
             <a:endParaRPr lang="en-GB"/>
           </a:p>
@@ -8209,7 +8209,7 @@
           <a:p>
             <a:fld id="{08B972FC-9C63-1B41-803B-B958A5F6CE25}" type="datetime1">
               <a:rPr lang="en-GB" smtClean="0"/>
-              <a:t>16/02/2025</a:t>
+              <a:t>24/10/2025</a:t>
             </a:fld>
             <a:endParaRPr lang="en-GB"/>
           </a:p>
@@ -8337,7 +8337,7 @@
           <a:p>
             <a:fld id="{05210873-7FD8-1244-ABA1-499AC4AF712B}" type="datetime1">
               <a:rPr lang="en-GB" smtClean="0"/>
-              <a:t>16/02/2025</a:t>
+              <a:t>24/10/2025</a:t>
             </a:fld>
             <a:endParaRPr lang="en-GB"/>
           </a:p>
@@ -8567,7 +8567,7 @@
           <a:p>
             <a:fld id="{5075CE0D-163E-D54F-96AD-C92D6F353048}" type="datetime1">
               <a:rPr lang="en-GB" smtClean="0"/>
-              <a:t>16/02/2025</a:t>
+              <a:t>24/10/2025</a:t>
             </a:fld>
             <a:endParaRPr lang="en-GB"/>
           </a:p>
@@ -9786,7 +9786,7 @@
           </a:ln>
           <a:extLst>
             <a:ext uri="{C572A759-6A51-4108-AA02-DFA0A04FC94B}">
-              <ma14:wrappingTextBoxFlag xmlns="" xmlns:ma14="http://schemas.microsoft.com/office/mac/drawingml/2011/main" val="1"/>
+              <ma14:wrappingTextBoxFlag xmlns:ma14="http://schemas.microsoft.com/office/mac/drawingml/2011/main" xmlns="" val="1"/>
             </a:ext>
           </a:extLst>
         </p:spPr>
@@ -9983,7 +9983,7 @@
           </a:ln>
           <a:extLst>
             <a:ext uri="{C572A759-6A51-4108-AA02-DFA0A04FC94B}">
-              <ma14:wrappingTextBoxFlag xmlns="" xmlns:ma14="http://schemas.microsoft.com/office/mac/drawingml/2011/main" val="1"/>
+              <ma14:wrappingTextBoxFlag xmlns:ma14="http://schemas.microsoft.com/office/mac/drawingml/2011/main" xmlns="" val="1"/>
             </a:ext>
           </a:extLst>
         </p:spPr>
@@ -10246,7 +10246,7 @@
           </a:ln>
           <a:extLst>
             <a:ext uri="{C572A759-6A51-4108-AA02-DFA0A04FC94B}">
-              <ma14:wrappingTextBoxFlag xmlns="" xmlns:ma14="http://schemas.microsoft.com/office/mac/drawingml/2011/main" val="1"/>
+              <ma14:wrappingTextBoxFlag xmlns:ma14="http://schemas.microsoft.com/office/mac/drawingml/2011/main" xmlns="" val="1"/>
             </a:ext>
           </a:extLst>
         </p:spPr>
@@ -11267,7 +11267,7 @@
           <a:p>
             <a:fld id="{330677AC-4808-7844-8878-C4DC36017FAF}" type="datetime1">
               <a:rPr lang="en-GB" smtClean="0"/>
-              <a:t>16/02/2025</a:t>
+              <a:t>24/10/2025</a:t>
             </a:fld>
             <a:endParaRPr lang="en-GB"/>
           </a:p>
@@ -11794,7 +11794,7 @@
           <a:p>
             <a:fld id="{05A8478A-EDB8-3145-A182-C5ED532937CD}" type="datetime1">
               <a:rPr lang="en-GB" smtClean="0"/>
-              <a:t>16/02/2025</a:t>
+              <a:t>24/10/2025</a:t>
             </a:fld>
             <a:endParaRPr lang="en-GB"/>
           </a:p>
@@ -12172,7 +12172,7 @@
           <a:p>
             <a:fld id="{3A861D55-4B75-6148-B497-8307DFA79D9F}" type="datetime1">
               <a:rPr lang="en-GB" smtClean="0"/>
-              <a:t>16/02/2025</a:t>
+              <a:t>24/10/2025</a:t>
             </a:fld>
             <a:endParaRPr lang="en-GB"/>
           </a:p>
@@ -12490,7 +12490,7 @@
           <a:p>
             <a:fld id="{23E27BC6-0B0F-3C48-A90A-106E7F9DC3AC}" type="datetime1">
               <a:rPr lang="en-GB" smtClean="0"/>
-              <a:t>16/02/2025</a:t>
+              <a:t>24/10/2025</a:t>
             </a:fld>
             <a:endParaRPr lang="en-GB"/>
           </a:p>
@@ -12872,7 +12872,7 @@
           <a:p>
             <a:fld id="{52156CEE-F6CC-7B46-8301-E62F55883839}" type="datetime1">
               <a:rPr lang="en-GB" smtClean="0"/>
-              <a:t>16/02/2025</a:t>
+              <a:t>24/10/2025</a:t>
             </a:fld>
             <a:endParaRPr lang="en-GB"/>
           </a:p>
@@ -13254,7 +13254,7 @@
           <a:p>
             <a:fld id="{F44621EF-E3B6-AC44-B311-3F80F8F520D1}" type="datetime1">
               <a:rPr lang="en-GB" smtClean="0"/>
-              <a:t>16/02/2025</a:t>
+              <a:t>24/10/2025</a:t>
             </a:fld>
             <a:endParaRPr lang="en-GB"/>
           </a:p>
@@ -13636,7 +13636,7 @@
           <a:p>
             <a:fld id="{D97C8151-BC5D-0342-B9A9-219468AF0BB5}" type="datetime1">
               <a:rPr lang="en-GB" smtClean="0"/>
-              <a:t>16/02/2025</a:t>
+              <a:t>24/10/2025</a:t>
             </a:fld>
             <a:endParaRPr lang="en-GB"/>
           </a:p>
@@ -13969,7 +13969,7 @@
           <a:p>
             <a:fld id="{31D05CA0-F179-1E48-8911-D48A170F3146}" type="datetime1">
               <a:rPr lang="en-GB" smtClean="0"/>
-              <a:t>16/02/2025</a:t>
+              <a:t>24/10/2025</a:t>
             </a:fld>
             <a:endParaRPr lang="en-GB"/>
           </a:p>
@@ -15240,8 +15240,8 @@
           <a:lstStyle/>
           <a:p>
             <a:r>
-              <a:rPr lang="en-GB"/>
-              <a:t>February 2025</a:t>
+              <a:rPr lang="en-GB" dirty="0"/>
+              <a:t>October 2025</a:t>
             </a:r>
           </a:p>
         </p:txBody>
@@ -16297,25 +16297,46 @@
           <a:lstStyle/>
           <a:p>
             <a:r>
-              <a:rPr lang="en-GB" sz="1800"/>
+              <a:rPr lang="en-GB" sz="1800" dirty="0" err="1"/>
+              <a:t>Qq</a:t>
+            </a:r>
+            <a:r>
+              <a:rPr lang="en-GB" sz="1800" dirty="0"/>
+              <a:t> do we want to do this in the intro presentation, or later? Should the whole </a:t>
+            </a:r>
+            <a:r>
+              <a:rPr lang="en-GB" sz="1800" dirty="0" err="1"/>
+              <a:t>tetris</a:t>
+            </a:r>
+            <a:r>
+              <a:rPr lang="en-GB" sz="1800" dirty="0"/>
+              <a:t> section be later?</a:t>
+            </a:r>
+          </a:p>
+          <a:p>
+            <a:endParaRPr lang="en-GB" sz="1800" dirty="0"/>
+          </a:p>
+          <a:p>
+            <a:r>
+              <a:rPr lang="en-GB" sz="1800" dirty="0"/>
               <a:t>Let’s take 15 minutes to play some Tetris so that you can introduce yourself to, or remind yourself of, the gameplay.</a:t>
             </a:r>
           </a:p>
           <a:p>
-            <a:endParaRPr lang="en-GB" sz="1800"/>
-          </a:p>
-          <a:p>
-            <a:r>
-              <a:rPr lang="en-GB" sz="1800"/>
+            <a:endParaRPr lang="en-GB" sz="1800" dirty="0"/>
+          </a:p>
+          <a:p>
+            <a:r>
+              <a:rPr lang="en-GB" sz="1800" dirty="0"/>
               <a:t>You can play Tetris here: </a:t>
             </a:r>
             <a:r>
-              <a:rPr lang="en-GB" sz="1800">
+              <a:rPr lang="en-GB" sz="1800" dirty="0">
                 <a:hlinkClick r:id="rId3"/>
               </a:rPr>
               <a:t>https://tetris.com/play-tetris</a:t>
             </a:r>
-            <a:endParaRPr lang="en-GB" sz="1800"/>
+            <a:endParaRPr lang="en-GB" sz="1800" dirty="0"/>
           </a:p>
         </p:txBody>
       </p:sp>
@@ -16978,10 +16999,10 @@
           <a:lstStyle/>
           <a:p>
             <a:r>
-              <a:rPr lang="en-GB"/>
+              <a:rPr lang="en-GB" dirty="0"/>
               <a:t>What technology are we going to use?</a:t>
             </a:r>
-            <a:endParaRPr lang="en-US"/>
+            <a:endParaRPr lang="en-US" dirty="0"/>
           </a:p>
         </p:txBody>
       </p:sp>
@@ -17069,7 +17090,7 @@
           <a:lstStyle/>
           <a:p>
             <a:r>
-              <a:rPr lang="en-GB" sz="1800" b="1">
+              <a:rPr lang="en-GB" sz="1800" b="1" dirty="0">
                 <a:solidFill>
                   <a:schemeClr val="accent1"/>
                 </a:solidFill>
@@ -17078,7 +17099,7 @@
             </a:r>
           </a:p>
           <a:p>
-            <a:endParaRPr lang="en-GB" sz="1800" b="1">
+            <a:endParaRPr lang="en-GB" sz="1800" b="1" dirty="0">
               <a:solidFill>
                 <a:schemeClr val="accent1"/>
               </a:solidFill>
@@ -17086,7 +17107,7 @@
           </a:p>
           <a:p>
             <a:r>
-              <a:rPr lang="en-GB" sz="1500"/>
+              <a:rPr lang="en-GB" sz="1500" dirty="0"/>
               <a:t>The frontend code base will be written in HTML/CSS/JS.</a:t>
             </a:r>
           </a:p>
@@ -17096,7 +17117,7 @@
               <a:buChar char="•"/>
             </a:pPr>
             <a:r>
-              <a:rPr lang="en-GB" sz="1500"/>
+              <a:rPr lang="en-GB" sz="1500" dirty="0"/>
               <a:t>HTML provides the basic structure of each page</a:t>
             </a:r>
           </a:p>
@@ -17106,7 +17127,7 @@
               <a:buChar char="•"/>
             </a:pPr>
             <a:r>
-              <a:rPr lang="en-GB" sz="1500"/>
+              <a:rPr lang="en-GB" sz="1500" dirty="0"/>
               <a:t>CSS is used to control the formatting and layout of the HTML content</a:t>
             </a:r>
           </a:p>
@@ -17116,25 +17137,25 @@
               <a:buChar char="•"/>
             </a:pPr>
             <a:r>
-              <a:rPr lang="en-GB" sz="1500"/>
+              <a:rPr lang="en-GB" sz="1500" dirty="0"/>
               <a:t>JavaScript is used to control the behaviour of different elements on the page</a:t>
             </a:r>
           </a:p>
           <a:p>
-            <a:endParaRPr lang="en-GB" sz="1500"/>
-          </a:p>
-          <a:p>
-            <a:r>
-              <a:rPr lang="en-GB" sz="1500"/>
+            <a:endParaRPr lang="en-GB" sz="1500" dirty="0"/>
+          </a:p>
+          <a:p>
+            <a:r>
+              <a:rPr lang="en-GB" sz="1500" dirty="0"/>
               <a:t>There will be a presentation tomorrow with more details about frontend development and there is more information in the README.</a:t>
             </a:r>
           </a:p>
           <a:p>
-            <a:endParaRPr lang="en-GB" sz="1500"/>
-          </a:p>
-          <a:p>
-            <a:r>
-              <a:rPr lang="en-GB" sz="1500"/>
+            <a:endParaRPr lang="en-GB" sz="1500" dirty="0"/>
+          </a:p>
+          <a:p>
+            <a:r>
+              <a:rPr lang="en-GB" sz="1500" dirty="0"/>
               <a:t>We will not be using any JavaScript framework or library or working with Typescript. These things are excellent, and very common on professional software projects, but by working with “vanilla” JavaScript you’ll be able to focus more closely on writing code and will get a better fundamental understanding of how a website works.</a:t>
             </a:r>
           </a:p>
@@ -17291,7 +17312,7 @@
           <a:lstStyle/>
           <a:p>
             <a:r>
-              <a:rPr lang="en-GB" sz="1800" b="1">
+              <a:rPr lang="en-GB" sz="1800" b="1" dirty="0">
                 <a:solidFill>
                   <a:schemeClr val="accent1"/>
                 </a:solidFill>
@@ -17300,7 +17321,7 @@
             </a:r>
           </a:p>
           <a:p>
-            <a:endParaRPr lang="en-GB" sz="1800" b="1">
+            <a:endParaRPr lang="en-GB" sz="1800" b="1" dirty="0">
               <a:solidFill>
                 <a:schemeClr val="accent1"/>
               </a:solidFill>
@@ -17308,35 +17329,26 @@
           </a:p>
           <a:p>
             <a:r>
-              <a:rPr lang="en-GB" sz="1500"/>
+              <a:rPr lang="en-GB" sz="1500" dirty="0"/>
               <a:t>The backend for the website is a Node.js/Express web application. The code for this application will also be written in JavaScript.</a:t>
             </a:r>
           </a:p>
           <a:p>
-            <a:endParaRPr lang="en-GB" sz="1500"/>
-          </a:p>
-          <a:p>
-            <a:r>
-              <a:rPr lang="en-GB" sz="1500"/>
+            <a:endParaRPr lang="en-GB" sz="1500" dirty="0"/>
+          </a:p>
+          <a:p>
+            <a:r>
+              <a:rPr lang="en-GB" sz="1500" dirty="0"/>
               <a:t>Node.js is a JavaScript runtime that allows JavaScript to run outside of a web browser. You don’t need to know too much about it, other than that it’s what we’re using! I am of course happy to discuss in more detail with those who are interested.</a:t>
             </a:r>
           </a:p>
           <a:p>
-            <a:endParaRPr lang="en-GB" sz="1500"/>
-          </a:p>
-          <a:p>
-            <a:r>
-              <a:rPr lang="en-GB" sz="1500"/>
+            <a:endParaRPr lang="en-GB" sz="1500" dirty="0"/>
+          </a:p>
+          <a:p>
+            <a:r>
+              <a:rPr lang="en-GB" sz="1500" dirty="0"/>
               <a:t>Express is a Node.js web application framework. It allows web applications to be built quickly, easily and robustly.</a:t>
-            </a:r>
-          </a:p>
-          <a:p>
-            <a:endParaRPr lang="en-GB" sz="1500"/>
-          </a:p>
-          <a:p>
-            <a:r>
-              <a:rPr lang="en-GB" sz="1500"/>
-              <a:t>On Wednesday, I’ll be explaining the backend codebase in more detail. I expect we will all start by working on frontend code.</a:t>
             </a:r>
           </a:p>
         </p:txBody>
@@ -17581,16 +17593,16 @@
           <a:lstStyle/>
           <a:p>
             <a:r>
-              <a:rPr lang="en-GB" sz="1400"/>
+              <a:rPr lang="en-GB" sz="1400" dirty="0"/>
               <a:t>“Scrum” is a project management technique that is commonly used on software projects. It is a subset of “Agile”.</a:t>
             </a:r>
           </a:p>
           <a:p>
-            <a:endParaRPr lang="en-GB" sz="1400"/>
-          </a:p>
-          <a:p>
-            <a:r>
-              <a:rPr lang="en-GB" sz="1400"/>
+            <a:endParaRPr lang="en-GB" sz="1400" dirty="0"/>
+          </a:p>
+          <a:p>
+            <a:r>
+              <a:rPr lang="en-GB" sz="1400" dirty="0"/>
               <a:t>There’s lots to it, but in summary:</a:t>
             </a:r>
           </a:p>
@@ -17600,7 +17612,7 @@
               <a:buChar char="•"/>
             </a:pPr>
             <a:r>
-              <a:rPr lang="en-GB" sz="1400"/>
+              <a:rPr lang="en-GB" sz="1400" dirty="0"/>
               <a:t>Work is done in short “Sprints”</a:t>
             </a:r>
           </a:p>
@@ -17610,7 +17622,7 @@
               <a:buChar char="•"/>
             </a:pPr>
             <a:r>
-              <a:rPr lang="en-GB" sz="1400"/>
+              <a:rPr lang="en-GB" sz="1400" dirty="0"/>
               <a:t>At the start of a sprint, the work to be done in the sprint is defined and goals are set</a:t>
             </a:r>
           </a:p>
@@ -17620,7 +17632,7 @@
               <a:buChar char="•"/>
             </a:pPr>
             <a:r>
-              <a:rPr lang="en-GB" sz="1400"/>
+              <a:rPr lang="en-GB" sz="1400" dirty="0"/>
               <a:t>There is a dedicated “scrum master” who is responsible for keeping the team on track</a:t>
             </a:r>
           </a:p>
@@ -17630,16 +17642,8 @@
               <a:buChar char="•"/>
             </a:pPr>
             <a:r>
-              <a:rPr lang="en-GB" sz="1400"/>
-              <a:t>During the sprint, there is a daily “</a:t>
-            </a:r>
-            <a:r>
-              <a:rPr lang="en-GB" sz="1400" err="1"/>
-              <a:t>standup</a:t>
-            </a:r>
-            <a:r>
-              <a:rPr lang="en-GB" sz="1400"/>
-              <a:t>” meeting to discuss how things are going and if there are any issues</a:t>
+              <a:rPr lang="en-GB" sz="1400" dirty="0"/>
+              <a:t>During the sprint, there is a daily “standup” meeting to discuss how things are going and if there are any issues</a:t>
             </a:r>
           </a:p>
           <a:p>
@@ -17648,7 +17652,7 @@
               <a:buChar char="•"/>
             </a:pPr>
             <a:r>
-              <a:rPr lang="en-GB" sz="1400"/>
+              <a:rPr lang="en-GB" sz="1400" dirty="0"/>
               <a:t>During the sprint, people work on the various tasks and goals</a:t>
             </a:r>
           </a:p>
@@ -17658,7 +17662,7 @@
               <a:buChar char="•"/>
             </a:pPr>
             <a:r>
-              <a:rPr lang="en-GB" sz="1400"/>
+              <a:rPr lang="en-GB" sz="1400" dirty="0"/>
               <a:t>At the end of the sprint, a retro meeting is held to review how the sprint went and discuss any ideas to be applied in future sprints</a:t>
             </a:r>
           </a:p>
@@ -17667,20 +17671,12 @@
               <a:buFont typeface="Arial" panose="020B0604020202020204" pitchFamily="34" charset="0"/>
               <a:buChar char="•"/>
             </a:pPr>
-            <a:endParaRPr lang="en-GB" sz="1400"/>
-          </a:p>
-          <a:p>
-            <a:r>
-              <a:rPr lang="en-GB" sz="1400"/>
-              <a:t>This week will be structured a bit like a sprint. We’ll start by defining goals for the week and features that we’d like our website to have. We’ll have a </a:t>
-            </a:r>
-            <a:r>
-              <a:rPr lang="en-GB" sz="1400" err="1"/>
-              <a:t>standup</a:t>
-            </a:r>
-            <a:r>
-              <a:rPr lang="en-GB" sz="1400"/>
-              <a:t> meeting at the start of every day and at the end of the week we’ll have a retro to see how things have gone and if we’ve met the goals we set out at the start of the week.</a:t>
+            <a:endParaRPr lang="en-GB" sz="1400" dirty="0"/>
+          </a:p>
+          <a:p>
+            <a:r>
+              <a:rPr lang="en-GB" sz="1400" dirty="0"/>
+              <a:t>This week will be structured a bit like a sprint. We’ll start by defining goals for the week and features that we’d like our website to have. We’ll have a standup meeting at the start of every day and at the end of the week we’ll have a retro to see how things have gone and if we’ve met the goals we set out at the start of the week.</a:t>
             </a:r>
           </a:p>
         </p:txBody>
@@ -18918,25 +18914,33 @@
           <a:lstStyle/>
           <a:p>
             <a:r>
-              <a:rPr lang="en-GB" sz="1350"/>
+              <a:rPr lang="en-GB" sz="1350" dirty="0"/>
               <a:t>We will all be working on the same codebase, using Git and GitHub (I’ll be explaining how these work later this morning).</a:t>
             </a:r>
           </a:p>
           <a:p>
-            <a:endParaRPr lang="en-GB" sz="1350"/>
-          </a:p>
-          <a:p>
-            <a:r>
-              <a:rPr lang="en-GB" sz="1350"/>
-              <a:t>The repository can be found at `https://github.com/XakSenSoftwire/softwire-work-experience-feb-2025`</a:t>
-            </a:r>
-          </a:p>
-          <a:p>
-            <a:endParaRPr lang="en-GB" sz="1350"/>
-          </a:p>
-          <a:p>
-            <a:r>
-              <a:rPr lang="en-GB" sz="1350"/>
+            <a:endParaRPr lang="en-GB" sz="1350" dirty="0"/>
+          </a:p>
+          <a:p>
+            <a:r>
+              <a:rPr lang="en-GB" sz="1350" dirty="0"/>
+              <a:t>The repository can be found at `https://github.com/</a:t>
+            </a:r>
+            <a:r>
+              <a:rPr lang="en-GB" sz="1350" dirty="0" err="1"/>
+              <a:t>carolynbarker</a:t>
+            </a:r>
+            <a:r>
+              <a:rPr lang="en-GB" sz="1350" dirty="0"/>
+              <a:t>/softwire-work-experience-oct-2025`</a:t>
+            </a:r>
+          </a:p>
+          <a:p>
+            <a:endParaRPr lang="en-GB" sz="1350" dirty="0"/>
+          </a:p>
+          <a:p>
+            <a:r>
+              <a:rPr lang="en-GB" sz="1350" dirty="0"/>
               <a:t>As well as the code, this repository contains:</a:t>
             </a:r>
           </a:p>
@@ -18946,42 +18950,42 @@
               <a:buChar char="•"/>
             </a:pPr>
             <a:r>
-              <a:rPr lang="en-GB" sz="1350"/>
+              <a:rPr lang="en-GB" sz="1350" dirty="0"/>
               <a:t>A README file, which you can read by scrolling down on the link above. This README contains everything you’ll need to know, including:</a:t>
             </a:r>
           </a:p>
           <a:p>
             <a:pPr marL="819150" lvl="2" indent="-285750"/>
             <a:r>
-              <a:rPr lang="en-GB" sz="1350"/>
+              <a:rPr lang="en-GB" sz="1350" dirty="0"/>
               <a:t>Set up process</a:t>
             </a:r>
           </a:p>
           <a:p>
             <a:pPr marL="819150" lvl="2" indent="-285750"/>
             <a:r>
-              <a:rPr lang="en-GB" sz="1350"/>
+              <a:rPr lang="en-GB" sz="1350" dirty="0"/>
               <a:t>How to run the website locally</a:t>
             </a:r>
           </a:p>
           <a:p>
             <a:pPr marL="819150" lvl="2" indent="-285750"/>
             <a:r>
-              <a:rPr lang="en-GB" sz="1350"/>
+              <a:rPr lang="en-GB" sz="1350" dirty="0"/>
               <a:t>Technical overview</a:t>
             </a:r>
           </a:p>
           <a:p>
             <a:pPr marL="819150" lvl="2" indent="-285750"/>
             <a:r>
-              <a:rPr lang="en-GB" sz="1350"/>
+              <a:rPr lang="en-GB" sz="1350" dirty="0"/>
               <a:t>How to contribute code</a:t>
             </a:r>
           </a:p>
           <a:p>
             <a:pPr marL="819150" lvl="2" indent="-285750"/>
             <a:r>
-              <a:rPr lang="en-GB" sz="1350"/>
+              <a:rPr lang="en-GB" sz="1350" dirty="0"/>
               <a:t>Useful links</a:t>
             </a:r>
           </a:p>
@@ -18991,7 +18995,7 @@
               <a:buChar char="•"/>
             </a:pPr>
             <a:r>
-              <a:rPr lang="en-GB" sz="1350"/>
+              <a:rPr lang="en-GB" sz="1350" dirty="0"/>
               <a:t>The slides for all the presentations I’ll be giving this week in case you want to look back and remind yourself of anything</a:t>
             </a:r>
           </a:p>
@@ -19059,14 +19063,14 @@
           <a:lstStyle/>
           <a:p>
             <a:r>
-              <a:rPr lang="en-US"/>
-              <a:t>Xak Sen &amp; Wendi Fan</a:t>
+              <a:rPr lang="en-US" dirty="0"/>
+              <a:t>Caz Yang &amp; Carolyn Barker</a:t>
             </a:r>
           </a:p>
           <a:p>
             <a:pPr lvl="1"/>
             <a:r>
-              <a:rPr lang="en-GB"/>
+              <a:rPr lang="en-GB" dirty="0"/>
               <a:t>Software Developers</a:t>
             </a:r>
           </a:p>
@@ -19101,14 +19105,14 @@
           <a:lstStyle/>
           <a:p>
             <a:r>
-              <a:rPr lang="en-GB"/>
-              <a:t>xak.sen@softwire.com</a:t>
-            </a:r>
-          </a:p>
-          <a:p>
-            <a:r>
-              <a:rPr lang="en-GB"/>
-              <a:t>wendi.fan@softwire.com</a:t>
+              <a:rPr lang="en-GB" dirty="0"/>
+              <a:t>caz.yang@softwire.com</a:t>
+            </a:r>
+          </a:p>
+          <a:p>
+            <a:r>
+              <a:rPr lang="en-GB" dirty="0"/>
+              <a:t>carolyn.barker@softwire.com</a:t>
             </a:r>
           </a:p>
         </p:txBody>
@@ -19709,8 +19713,12 @@
               <a:buChar char="•"/>
             </a:pPr>
             <a:r>
-              <a:rPr lang="en-GB"/>
-              <a:t>Xak Sen</a:t>
+              <a:rPr lang="en-GB" dirty="0" err="1"/>
+              <a:t>Qq</a:t>
+            </a:r>
+            <a:r>
+              <a:rPr lang="en-GB" dirty="0"/>
+              <a:t> Caz bio slide</a:t>
             </a:r>
           </a:p>
           <a:p>
@@ -19722,8 +19730,12 @@
               <a:buChar char="•"/>
             </a:pPr>
             <a:r>
-              <a:rPr lang="en-GB"/>
-              <a:t>Studied Aerospace Engineering at the University of Bath where I worked at Amazon &amp; Rolls-Royce whilst completing my Masters degree</a:t>
+              <a:rPr lang="en-GB" dirty="0" err="1"/>
+              <a:t>Xak</a:t>
+            </a:r>
+            <a:r>
+              <a:rPr lang="en-GB" dirty="0"/>
+              <a:t> Sen</a:t>
             </a:r>
           </a:p>
           <a:p>
@@ -19735,8 +19747,8 @@
               <a:buChar char="•"/>
             </a:pPr>
             <a:r>
-              <a:rPr lang="en-GB"/>
-              <a:t>Self taught through online courses &amp; hobby programming (C++, Python, HTML, MATLAB)</a:t>
+              <a:rPr lang="en-GB" dirty="0"/>
+              <a:t>Studied Aerospace Engineering at the University of Bath where I worked at Amazon &amp; Rolls-Royce whilst completing my Masters degree</a:t>
             </a:r>
           </a:p>
           <a:p>
@@ -19748,8 +19760,8 @@
               <a:buChar char="•"/>
             </a:pPr>
             <a:r>
-              <a:rPr lang="en-GB"/>
-              <a:t>Pivoted to Software Engineering</a:t>
+              <a:rPr lang="en-GB" dirty="0"/>
+              <a:t>Self taught through online courses &amp; hobby programming (C++, Python, HTML, MATLAB)</a:t>
             </a:r>
           </a:p>
           <a:p>
@@ -19761,8 +19773,8 @@
               <a:buChar char="•"/>
             </a:pPr>
             <a:r>
-              <a:rPr lang="en-GB"/>
-              <a:t>Started at Softwire in September 2024 – no professional coding experience at the time</a:t>
+              <a:rPr lang="en-GB" dirty="0"/>
+              <a:t>Pivoted to Software Engineering</a:t>
             </a:r>
           </a:p>
           <a:p>
@@ -19774,16 +19786,8 @@
               <a:buChar char="•"/>
             </a:pPr>
             <a:r>
-              <a:rPr lang="en-GB"/>
-              <a:t>I’ve worked on Channel 5 &amp; </a:t>
-            </a:r>
-            <a:r>
-              <a:rPr lang="en-GB" err="1"/>
-              <a:t>Elexon</a:t>
-            </a:r>
-            <a:r>
-              <a:rPr lang="en-GB"/>
-              <a:t> projects since joining (React, .NET, Ruby on Rails)</a:t>
+              <a:rPr lang="en-GB" dirty="0"/>
+              <a:t>Started at Softwire in September 2024 – no professional coding experience at the time</a:t>
             </a:r>
           </a:p>
           <a:p>
@@ -19795,8 +19799,16 @@
               <a:buChar char="•"/>
             </a:pPr>
             <a:r>
-              <a:rPr lang="en-GB"/>
-              <a:t>Outside of work, I spend most of my time playing football, pool, travelling abroad, chess, FPS games &amp; board games</a:t>
+              <a:rPr lang="en-GB" dirty="0"/>
+              <a:t>I’ve worked on Channel 5 &amp; </a:t>
+            </a:r>
+            <a:r>
+              <a:rPr lang="en-GB" dirty="0" err="1"/>
+              <a:t>Elexon</a:t>
+            </a:r>
+            <a:r>
+              <a:rPr lang="en-GB" dirty="0"/>
+              <a:t> projects since joining (React, .NET, Ruby on Rails)</a:t>
             </a:r>
           </a:p>
           <a:p>
@@ -19807,7 +19819,20 @@
               <a:buFont typeface="Arial" panose="020B0604020202020204" pitchFamily="34" charset="0"/>
               <a:buChar char="•"/>
             </a:pPr>
-            <a:endParaRPr lang="en-GB"/>
+            <a:r>
+              <a:rPr lang="en-GB" dirty="0"/>
+              <a:t>Outside of work, I spend most of my time playing football, pool, travelling abroad, chess, FPS games &amp; board games</a:t>
+            </a:r>
+          </a:p>
+          <a:p>
+            <a:pPr marL="285750" indent="-285750">
+              <a:lnSpc>
+                <a:spcPct val="90000"/>
+              </a:lnSpc>
+              <a:buFont typeface="Arial" panose="020B0604020202020204" pitchFamily="34" charset="0"/>
+              <a:buChar char="•"/>
+            </a:pPr>
+            <a:endParaRPr lang="en-GB" dirty="0"/>
           </a:p>
         </p:txBody>
       </p:sp>
@@ -20008,10 +20033,10 @@
           <a:lstStyle/>
           <a:p>
             <a:r>
-              <a:rPr lang="en-GB"/>
+              <a:rPr lang="en-GB" dirty="0"/>
               <a:t>Who are we?</a:t>
             </a:r>
-            <a:endParaRPr lang="en-US"/>
+            <a:endParaRPr lang="en-US" dirty="0"/>
           </a:p>
         </p:txBody>
       </p:sp>
@@ -20039,9 +20064,26 @@
         </p:spPr>
         <p:txBody>
           <a:bodyPr vert="horz" lIns="0" tIns="0" rIns="0" bIns="0" rtlCol="0" anchor="t">
-            <a:normAutofit/>
+            <a:normAutofit lnSpcReduction="10000"/>
           </a:bodyPr>
           <a:lstStyle/>
+          <a:p>
+            <a:pPr marL="285750" indent="-285750">
+              <a:lnSpc>
+                <a:spcPct val="90000"/>
+              </a:lnSpc>
+              <a:buFont typeface="Arial" panose="020B0604020202020204" pitchFamily="34" charset="0"/>
+              <a:buChar char="•"/>
+            </a:pPr>
+            <a:r>
+              <a:rPr lang="en-GB" dirty="0" err="1"/>
+              <a:t>Qq</a:t>
+            </a:r>
+            <a:r>
+              <a:rPr lang="en-GB" dirty="0"/>
+              <a:t> Carolyn bio slide</a:t>
+            </a:r>
+          </a:p>
           <a:p>
             <a:pPr marL="285750" indent="-285750">
               <a:lnSpc>
@@ -20439,7 +20481,7 @@
               <a:buChar char="•"/>
             </a:pPr>
             <a:r>
-              <a:rPr lang="en-GB"/>
+              <a:rPr lang="en-GB" dirty="0"/>
               <a:t>What is your preferred name?</a:t>
             </a:r>
           </a:p>
@@ -20449,7 +20491,7 @@
               <a:buChar char="•"/>
             </a:pPr>
             <a:r>
-              <a:rPr lang="en-GB"/>
+              <a:rPr lang="en-GB" dirty="0"/>
               <a:t>Do you require any special accommodations to be comfortable this week? </a:t>
             </a:r>
           </a:p>
@@ -20459,7 +20501,7 @@
               <a:buChar char="•"/>
             </a:pPr>
             <a:r>
-              <a:rPr lang="en-GB"/>
+              <a:rPr lang="en-GB" dirty="0"/>
               <a:t>What are your previous experiences with Software Engineering? (It’s completely OK for your answer to be nothing yet!)	 </a:t>
             </a:r>
           </a:p>
@@ -20469,7 +20511,7 @@
               <a:buChar char="•"/>
             </a:pPr>
             <a:r>
-              <a:rPr lang="en-GB"/>
+              <a:rPr lang="en-GB" dirty="0"/>
               <a:t>Have you done any programming projects as schoolwork or as a hobby? (Again, your answer can be no here)</a:t>
             </a:r>
           </a:p>
@@ -20479,7 +20521,7 @@
               <a:buChar char="•"/>
             </a:pPr>
             <a:r>
-              <a:rPr lang="en-GB"/>
+              <a:rPr lang="en-GB" dirty="0"/>
               <a:t>Is there a topic you’d particularly like to focus on this week?</a:t>
             </a:r>
           </a:p>
@@ -20489,7 +20531,7 @@
               <a:buChar char="•"/>
             </a:pPr>
             <a:r>
-              <a:rPr lang="en-GB"/>
+              <a:rPr lang="en-GB" dirty="0"/>
               <a:t>What are your goals for this work experience?</a:t>
             </a:r>
           </a:p>
@@ -20499,7 +20541,7 @@
               <a:buChar char="•"/>
             </a:pPr>
             <a:r>
-              <a:rPr lang="en-GB"/>
+              <a:rPr lang="en-GB" dirty="0"/>
               <a:t>What do you expect from us, your trainers, this week?</a:t>
             </a:r>
           </a:p>
@@ -20509,7 +20551,7 @@
               <a:buChar char="•"/>
             </a:pPr>
             <a:r>
-              <a:rPr lang="en-GB"/>
+              <a:rPr lang="en-GB" dirty="0"/>
               <a:t>What do you like to do in your free time?</a:t>
             </a:r>
           </a:p>
@@ -21346,7 +21388,7 @@
               <a:buChar char="•"/>
             </a:pPr>
             <a:r>
-              <a:rPr lang="en-GB"/>
+              <a:rPr lang="en-GB" dirty="0"/>
               <a:t>9.55 AM – Meet at Softwire Reception &amp; sign in on tablet</a:t>
             </a:r>
           </a:p>
@@ -21356,8 +21398,8 @@
               <a:buChar char="•"/>
             </a:pPr>
             <a:r>
-              <a:rPr lang="en-GB"/>
-              <a:t>10.00 – We’ll meet you at reception and bring you to 410</a:t>
+              <a:rPr lang="en-GB" dirty="0"/>
+              <a:t>10.00 – We’ll meet you at reception and bring you to the desks</a:t>
             </a:r>
           </a:p>
           <a:p>
@@ -21366,7 +21408,7 @@
               <a:buChar char="•"/>
             </a:pPr>
             <a:r>
-              <a:rPr lang="en-GB"/>
+              <a:rPr lang="en-GB" dirty="0"/>
               <a:t>10.15 – Standup (daily update – I’ll explain this more later)</a:t>
             </a:r>
           </a:p>
@@ -21376,8 +21418,8 @@
               <a:buChar char="•"/>
             </a:pPr>
             <a:r>
-              <a:rPr lang="en-GB"/>
-              <a:t>1.00 PM – Lunch (1 hour)</a:t>
+              <a:rPr lang="en-GB" dirty="0"/>
+              <a:t>12.30 PM – Lunch (1 hour)</a:t>
             </a:r>
           </a:p>
           <a:p>
@@ -21386,8 +21428,8 @@
               <a:buChar char="•"/>
             </a:pPr>
             <a:r>
-              <a:rPr lang="en-GB"/>
-              <a:t>4.00 PM – We’ll take you back to Reception to sign out</a:t>
+              <a:rPr lang="en-GB" dirty="0"/>
+              <a:t>2.30 PM – Afternoon break</a:t>
             </a:r>
           </a:p>
           <a:p>
@@ -21396,8 +21438,8 @@
               <a:buChar char="•"/>
             </a:pPr>
             <a:r>
-              <a:rPr lang="en-GB"/>
-              <a:t>4.05 AM – Head home</a:t>
+              <a:rPr lang="en-GB" dirty="0"/>
+              <a:t>4.00 PM – We’ll take you back to Reception to sign out</a:t>
             </a:r>
           </a:p>
           <a:p>
@@ -21405,12 +21447,9 @@
               <a:buFont typeface="Arial" panose="020B0604020202020204" pitchFamily="34" charset="0"/>
               <a:buChar char="•"/>
             </a:pPr>
-            <a:endParaRPr lang="en-GB"/>
-          </a:p>
-          <a:p>
-            <a:r>
-              <a:rPr lang="en-GB"/>
-              <a:t>NB:</a:t>
+            <a:r>
+              <a:rPr lang="en-GB" dirty="0"/>
+              <a:t>4.05 AM – Head home</a:t>
             </a:r>
           </a:p>
           <a:p>
@@ -21418,9 +21457,12 @@
               <a:buFont typeface="Arial" panose="020B0604020202020204" pitchFamily="34" charset="0"/>
               <a:buChar char="•"/>
             </a:pPr>
-            <a:r>
-              <a:rPr lang="en-GB"/>
-              <a:t>Some days we’ll attend seminars hosted by other Softwire Engineers to expose you to general Software topics</a:t>
+            <a:endParaRPr lang="en-GB" dirty="0"/>
+          </a:p>
+          <a:p>
+            <a:r>
+              <a:rPr lang="en-GB" dirty="0"/>
+              <a:t>NB:</a:t>
             </a:r>
           </a:p>
           <a:p>
@@ -21429,8 +21471,8 @@
               <a:buChar char="•"/>
             </a:pPr>
             <a:r>
-              <a:rPr lang="en-GB"/>
-              <a:t>In between meetings, we’ll be working on our main project this week – building a Tetris game!</a:t>
+              <a:rPr lang="en-GB" dirty="0"/>
+              <a:t>Some days we’ll attend seminars hosted by other Softwire Engineers to expose you to general Software topics</a:t>
             </a:r>
           </a:p>
           <a:p>
@@ -21439,40 +21481,50 @@
               <a:buChar char="•"/>
             </a:pPr>
             <a:r>
-              <a:rPr lang="en-GB"/>
-              <a:t>Friday (after Lunch?) – you will be presenting your project &amp; learnings to the company as well as answering some questions about your time here</a:t>
-            </a:r>
-          </a:p>
-          <a:p>
-            <a:endParaRPr lang="en-GB"/>
+              <a:rPr lang="en-GB" dirty="0"/>
+              <a:t>In between meetings, we’ll be working on our main project this week – building a Tetris game!</a:t>
+            </a:r>
           </a:p>
           <a:p>
             <a:pPr marL="285750" indent="-285750">
               <a:buFont typeface="Arial" panose="020B0604020202020204" pitchFamily="34" charset="0"/>
               <a:buChar char="•"/>
             </a:pPr>
-            <a:endParaRPr lang="en-GB"/>
+            <a:r>
+              <a:rPr lang="en-GB" dirty="0"/>
+              <a:t>Friday (after Lunch?) – you will be presenting your project &amp; learnings to the company as well as answering some questions about your time here</a:t>
+            </a:r>
+          </a:p>
+          <a:p>
+            <a:endParaRPr lang="en-GB" dirty="0"/>
           </a:p>
           <a:p>
             <a:pPr marL="285750" indent="-285750">
               <a:buFont typeface="Arial" panose="020B0604020202020204" pitchFamily="34" charset="0"/>
               <a:buChar char="•"/>
             </a:pPr>
-            <a:endParaRPr lang="en-GB"/>
+            <a:endParaRPr lang="en-GB" dirty="0"/>
           </a:p>
           <a:p>
             <a:pPr marL="285750" indent="-285750">
               <a:buFont typeface="Arial" panose="020B0604020202020204" pitchFamily="34" charset="0"/>
               <a:buChar char="•"/>
             </a:pPr>
-            <a:endParaRPr lang="en-GB"/>
+            <a:endParaRPr lang="en-GB" dirty="0"/>
           </a:p>
           <a:p>
             <a:pPr marL="285750" indent="-285750">
               <a:buFont typeface="Arial" panose="020B0604020202020204" pitchFamily="34" charset="0"/>
               <a:buChar char="•"/>
             </a:pPr>
-            <a:endParaRPr lang="en-GB"/>
+            <a:endParaRPr lang="en-GB" dirty="0"/>
+          </a:p>
+          <a:p>
+            <a:pPr marL="285750" indent="-285750">
+              <a:buFont typeface="Arial" panose="020B0604020202020204" pitchFamily="34" charset="0"/>
+              <a:buChar char="•"/>
+            </a:pPr>
+            <a:endParaRPr lang="en-GB" dirty="0"/>
           </a:p>
         </p:txBody>
       </p:sp>
@@ -21719,6 +21771,45 @@
           </a:prstGeom>
         </p:spPr>
       </p:pic>
+      <p:sp>
+        <p:nvSpPr>
+          <p:cNvPr id="8" name="TextBox 7">
+            <a:extLst>
+              <a:ext uri="{FF2B5EF4-FFF2-40B4-BE49-F238E27FC236}">
+                <a16:creationId xmlns:a16="http://schemas.microsoft.com/office/drawing/2014/main" id="{84D9965C-1AE7-004C-0338-56A8D0DA24B7}"/>
+              </a:ext>
+            </a:extLst>
+          </p:cNvPr>
+          <p:cNvSpPr txBox="1"/>
+          <p:nvPr/>
+        </p:nvSpPr>
+        <p:spPr>
+          <a:xfrm>
+            <a:off x="2843867" y="276837"/>
+            <a:ext cx="6505663" cy="369332"/>
+          </a:xfrm>
+          <a:prstGeom prst="rect">
+            <a:avLst/>
+          </a:prstGeom>
+          <a:noFill/>
+        </p:spPr>
+        <p:txBody>
+          <a:bodyPr wrap="square" rtlCol="0">
+            <a:spAutoFit/>
+          </a:bodyPr>
+          <a:lstStyle/>
+          <a:p>
+            <a:r>
+              <a:rPr lang="en-GB" dirty="0" err="1"/>
+              <a:t>Qq</a:t>
+            </a:r>
+            <a:r>
+              <a:rPr lang="en-GB" dirty="0"/>
+              <a:t> update to new timetable when finalised</a:t>
+            </a:r>
+          </a:p>
+        </p:txBody>
+      </p:sp>
     </p:spTree>
     <p:extLst>
       <p:ext uri="{BB962C8B-B14F-4D97-AF65-F5344CB8AC3E}">
@@ -22532,15 +22623,6 @@
 </file>
 
 <file path=customXml/item1.xml><?xml version="1.0" encoding="utf-8"?>
-<?mso-contentType ?>
-<FormTemplates xmlns="http://schemas.microsoft.com/sharepoint/v3/contenttype/forms">
-  <Display>DocumentLibraryForm</Display>
-  <Edit>DocumentLibraryForm</Edit>
-  <New>DocumentLibraryForm</New>
-</FormTemplates>
-</file>
-
-<file path=customXml/item2.xml><?xml version="1.0" encoding="utf-8"?>
 <ct:contentTypeSchema xmlns:ct="http://schemas.microsoft.com/office/2006/metadata/contentType" xmlns:ma="http://schemas.microsoft.com/office/2006/metadata/properties/metaAttributes" ct:_="" ma:_="" ma:contentTypeName="Document" ma:contentTypeID="0x010100C41CF2333F1C904B80A4811D68B50097" ma:contentTypeVersion="12" ma:contentTypeDescription="Create a new document." ma:contentTypeScope="" ma:versionID="ed495581af461ca466c171f5b872cd83">
   <xsd:schema xmlns:xsd="http://www.w3.org/2001/XMLSchema" xmlns:xs="http://www.w3.org/2001/XMLSchema" xmlns:p="http://schemas.microsoft.com/office/2006/metadata/properties" xmlns:ns2="b3e7612e-fdb2-4974-b106-74dc7088542d" xmlns:ns3="16822fe8-4949-411e-b509-0583e0da6ec6" targetNamespace="http://schemas.microsoft.com/office/2006/metadata/properties" ma:root="true" ma:fieldsID="b031bb905399b1b75517dac07ffd7c20" ns2:_="" ns3:_="">
     <xsd:import namespace="b3e7612e-fdb2-4974-b106-74dc7088542d"/>
@@ -22757,6 +22839,15 @@
 </ct:contentTypeSchema>
 </file>
 
+<file path=customXml/item2.xml><?xml version="1.0" encoding="utf-8"?>
+<?mso-contentType ?>
+<FormTemplates xmlns="http://schemas.microsoft.com/sharepoint/v3/contenttype/forms">
+  <Display>DocumentLibraryForm</Display>
+  <Edit>DocumentLibraryForm</Edit>
+  <New>DocumentLibraryForm</New>
+</FormTemplates>
+</file>
+
 <file path=customXml/item3.xml><?xml version="1.0" encoding="utf-8"?>
 <p:properties xmlns:p="http://schemas.microsoft.com/office/2006/metadata/properties" xmlns:xsi="http://www.w3.org/2001/XMLSchema-instance" xmlns:pc="http://schemas.microsoft.com/office/infopath/2007/PartnerControls">
   <documentManagement/>
@@ -22764,14 +22855,6 @@
 </file>
 
 <file path=customXml/itemProps1.xml><?xml version="1.0" encoding="utf-8"?>
-<ds:datastoreItem xmlns:ds="http://schemas.openxmlformats.org/officeDocument/2006/customXml" ds:itemID="{CE1CAEE4-FACD-4E29-9FA2-1415ACCF9B2B}">
-  <ds:schemaRefs>
-    <ds:schemaRef ds:uri="http://schemas.microsoft.com/sharepoint/v3/contenttype/forms"/>
-  </ds:schemaRefs>
-</ds:datastoreItem>
-</file>
-
-<file path=customXml/itemProps2.xml><?xml version="1.0" encoding="utf-8"?>
 <ds:datastoreItem xmlns:ds="http://schemas.openxmlformats.org/officeDocument/2006/customXml" ds:itemID="{4AEDF40A-C432-41BD-9360-5BDA75CC15AC}">
   <ds:schemaRefs>
     <ds:schemaRef ds:uri="16822fe8-4949-411e-b509-0583e0da6ec6"/>
@@ -22786,6 +22869,14 @@
     <ds:schemaRef ds:uri="http://schemas.microsoft.com/office/infopath/2007/PartnerControls"/>
     <ds:schemaRef ds:uri="http://schemas.openxmlformats.org/package/2006/metadata/core-properties"/>
     <ds:schemaRef ds:uri="http://www.w3.org/2001/XMLSchema"/>
+  </ds:schemaRefs>
+</ds:datastoreItem>
+</file>
+
+<file path=customXml/itemProps2.xml><?xml version="1.0" encoding="utf-8"?>
+<ds:datastoreItem xmlns:ds="http://schemas.openxmlformats.org/officeDocument/2006/customXml" ds:itemID="{CE1CAEE4-FACD-4E29-9FA2-1415ACCF9B2B}">
+  <ds:schemaRefs>
+    <ds:schemaRef ds:uri="http://schemas.microsoft.com/sharepoint/v3/contenttype/forms"/>
   </ds:schemaRefs>
 </ds:datastoreItem>
 </file>

</xml_diff>

<commit_message>
updated intro.pptx with Caz's about me slide updated README.md with Caz's email address
</commit_message>
<xml_diff>
--- a/course-assets/presentations/intro.pptx
+++ b/course-assets/presentations/intro.pptx
@@ -165,6 +165,93 @@
 
 <file path=ppt/changesInfos/changesInfo1.xml><?xml version="1.0" encoding="utf-8"?>
 <pc:chgInfo xmlns:a="http://schemas.openxmlformats.org/drawingml/2006/main" xmlns:r="http://schemas.openxmlformats.org/officeDocument/2006/relationships" xmlns:ac="http://schemas.microsoft.com/office/drawing/2013/main/command" xmlns:pc="http://schemas.microsoft.com/office/powerpoint/2013/main/command">
+  <pc:docChgLst>
+    <pc:chgData name="Wendi Fan" userId="S::wendi.fan@softwire.com::aa43677a-bbe8-4ac0-bfc8-43838de03ab4" providerId="AD" clId="Web-{997F4CA0-31C3-3461-53C9-704321DF8750}"/>
+    <pc:docChg chg="modSld">
+      <pc:chgData name="Wendi Fan" userId="S::wendi.fan@softwire.com::aa43677a-bbe8-4ac0-bfc8-43838de03ab4" providerId="AD" clId="Web-{997F4CA0-31C3-3461-53C9-704321DF8750}" dt="2025-02-14T12:53:32.258" v="447" actId="20577"/>
+      <pc:docMkLst>
+        <pc:docMk/>
+      </pc:docMkLst>
+      <pc:sldChg chg="addSp modSp">
+        <pc:chgData name="Wendi Fan" userId="S::wendi.fan@softwire.com::aa43677a-bbe8-4ac0-bfc8-43838de03ab4" providerId="AD" clId="Web-{997F4CA0-31C3-3461-53C9-704321DF8750}" dt="2025-02-14T12:53:32.258" v="447" actId="20577"/>
+        <pc:sldMkLst>
+          <pc:docMk/>
+          <pc:sldMk cId="432697297" sldId="4538"/>
+        </pc:sldMkLst>
+      </pc:sldChg>
+    </pc:docChg>
+  </pc:docChgLst>
+  <pc:docChgLst>
+    <pc:chgData name="Wendi Fan" userId="S::wendi.fan@softwire.com::aa43677a-bbe8-4ac0-bfc8-43838de03ab4" providerId="AD" clId="Web-{1AFC5FAA-D937-3F14-F412-45FE3D30AFD6}"/>
+    <pc:docChg chg="addSld delSld modSld">
+      <pc:chgData name="Wendi Fan" userId="S::wendi.fan@softwire.com::aa43677a-bbe8-4ac0-bfc8-43838de03ab4" providerId="AD" clId="Web-{1AFC5FAA-D937-3F14-F412-45FE3D30AFD6}" dt="2025-02-14T10:49:27.249" v="33"/>
+      <pc:docMkLst>
+        <pc:docMk/>
+      </pc:docMkLst>
+      <pc:sldChg chg="modSp del">
+        <pc:chgData name="Wendi Fan" userId="S::wendi.fan@softwire.com::aa43677a-bbe8-4ac0-bfc8-43838de03ab4" providerId="AD" clId="Web-{1AFC5FAA-D937-3F14-F412-45FE3D30AFD6}" dt="2025-02-14T10:49:27.249" v="33"/>
+        <pc:sldMkLst>
+          <pc:docMk/>
+          <pc:sldMk cId="1134830894" sldId="4535"/>
+        </pc:sldMkLst>
+      </pc:sldChg>
+      <pc:sldChg chg="delSp modSp add replId">
+        <pc:chgData name="Wendi Fan" userId="S::wendi.fan@softwire.com::aa43677a-bbe8-4ac0-bfc8-43838de03ab4" providerId="AD" clId="Web-{1AFC5FAA-D937-3F14-F412-45FE3D30AFD6}" dt="2025-02-14T10:49:17.905" v="32" actId="20577"/>
+        <pc:sldMkLst>
+          <pc:docMk/>
+          <pc:sldMk cId="432697297" sldId="4538"/>
+        </pc:sldMkLst>
+      </pc:sldChg>
+    </pc:docChg>
+  </pc:docChgLst>
+  <pc:docChgLst>
+    <pc:chgData name="Carolyn Barker" userId="22add79f-bf68-47c2-9e7d-aef0e205ab6d" providerId="ADAL" clId="{28540B9F-38D5-4CF5-A90A-54EE27A1F772}"/>
+    <pc:docChg chg="undo redo custSel modSld">
+      <pc:chgData name="Carolyn Barker" userId="22add79f-bf68-47c2-9e7d-aef0e205ab6d" providerId="ADAL" clId="{28540B9F-38D5-4CF5-A90A-54EE27A1F772}" dt="2025-10-25T13:27:28.272" v="446" actId="6549"/>
+      <pc:docMkLst>
+        <pc:docMk/>
+      </pc:docMkLst>
+      <pc:sldChg chg="addSp delSp modSp mod">
+        <pc:chgData name="Carolyn Barker" userId="22add79f-bf68-47c2-9e7d-aef0e205ab6d" providerId="ADAL" clId="{28540B9F-38D5-4CF5-A90A-54EE27A1F772}" dt="2025-10-25T13:27:28.272" v="446" actId="6549"/>
+        <pc:sldMkLst>
+          <pc:docMk/>
+          <pc:sldMk cId="432697297" sldId="4538"/>
+        </pc:sldMkLst>
+        <pc:spChg chg="mod">
+          <ac:chgData name="Carolyn Barker" userId="22add79f-bf68-47c2-9e7d-aef0e205ab6d" providerId="ADAL" clId="{28540B9F-38D5-4CF5-A90A-54EE27A1F772}" dt="2025-10-25T13:27:28.272" v="446" actId="6549"/>
+          <ac:spMkLst>
+            <pc:docMk/>
+            <pc:sldMk cId="432697297" sldId="4538"/>
+            <ac:spMk id="6" creationId="{023AE65F-D67E-8443-FB37-CFF5773DE671}"/>
+          </ac:spMkLst>
+        </pc:spChg>
+        <pc:picChg chg="add del mod">
+          <ac:chgData name="Carolyn Barker" userId="22add79f-bf68-47c2-9e7d-aef0e205ab6d" providerId="ADAL" clId="{28540B9F-38D5-4CF5-A90A-54EE27A1F772}" dt="2025-10-25T13:26:35.369" v="382" actId="478"/>
+          <ac:picMkLst>
+            <pc:docMk/>
+            <pc:sldMk cId="432697297" sldId="4538"/>
+            <ac:picMk id="3" creationId="{61C86583-12C9-80C6-8B69-5C7EF9849F1F}"/>
+          </ac:picMkLst>
+        </pc:picChg>
+        <pc:picChg chg="add mod">
+          <ac:chgData name="Carolyn Barker" userId="22add79f-bf68-47c2-9e7d-aef0e205ab6d" providerId="ADAL" clId="{28540B9F-38D5-4CF5-A90A-54EE27A1F772}" dt="2025-10-24T18:16:48.103" v="348"/>
+          <ac:picMkLst>
+            <pc:docMk/>
+            <pc:sldMk cId="432697297" sldId="4538"/>
+            <ac:picMk id="8" creationId="{045324B0-854F-2ACA-9000-F4919BADF50A}"/>
+          </ac:picMkLst>
+        </pc:picChg>
+        <pc:picChg chg="add mod">
+          <ac:chgData name="Carolyn Barker" userId="22add79f-bf68-47c2-9e7d-aef0e205ab6d" providerId="ADAL" clId="{28540B9F-38D5-4CF5-A90A-54EE27A1F772}" dt="2025-10-24T18:12:01.906" v="339" actId="1076"/>
+          <ac:picMkLst>
+            <pc:docMk/>
+            <pc:sldMk cId="432697297" sldId="4538"/>
+            <ac:picMk id="1026" creationId="{B4307F24-E0BA-22AD-069C-E15D5E5674B6}"/>
+          </ac:picMkLst>
+        </pc:picChg>
+      </pc:sldChg>
+    </pc:docChg>
+  </pc:docChgLst>
   <pc:docChgLst>
     <pc:chgData name="Xak Sen" userId="205c36fe-17a3-4cb6-8c10-e8f2284e4158" providerId="ADAL" clId="{788A0A26-18F8-4224-BD43-877C6878FE17}"/>
     <pc:docChg chg="undo custSel addSld delSld modSld sldOrd">
@@ -419,93 +506,6 @@
       </pc:sldChg>
     </pc:docChg>
   </pc:docChgLst>
-  <pc:docChgLst>
-    <pc:chgData name="Wendi Fan" userId="S::wendi.fan@softwire.com::aa43677a-bbe8-4ac0-bfc8-43838de03ab4" providerId="AD" clId="Web-{1AFC5FAA-D937-3F14-F412-45FE3D30AFD6}"/>
-    <pc:docChg chg="addSld delSld modSld">
-      <pc:chgData name="Wendi Fan" userId="S::wendi.fan@softwire.com::aa43677a-bbe8-4ac0-bfc8-43838de03ab4" providerId="AD" clId="Web-{1AFC5FAA-D937-3F14-F412-45FE3D30AFD6}" dt="2025-02-14T10:49:27.249" v="33"/>
-      <pc:docMkLst>
-        <pc:docMk/>
-      </pc:docMkLst>
-      <pc:sldChg chg="modSp del">
-        <pc:chgData name="Wendi Fan" userId="S::wendi.fan@softwire.com::aa43677a-bbe8-4ac0-bfc8-43838de03ab4" providerId="AD" clId="Web-{1AFC5FAA-D937-3F14-F412-45FE3D30AFD6}" dt="2025-02-14T10:49:27.249" v="33"/>
-        <pc:sldMkLst>
-          <pc:docMk/>
-          <pc:sldMk cId="1134830894" sldId="4535"/>
-        </pc:sldMkLst>
-      </pc:sldChg>
-      <pc:sldChg chg="delSp modSp add replId">
-        <pc:chgData name="Wendi Fan" userId="S::wendi.fan@softwire.com::aa43677a-bbe8-4ac0-bfc8-43838de03ab4" providerId="AD" clId="Web-{1AFC5FAA-D937-3F14-F412-45FE3D30AFD6}" dt="2025-02-14T10:49:17.905" v="32" actId="20577"/>
-        <pc:sldMkLst>
-          <pc:docMk/>
-          <pc:sldMk cId="432697297" sldId="4538"/>
-        </pc:sldMkLst>
-      </pc:sldChg>
-    </pc:docChg>
-  </pc:docChgLst>
-  <pc:docChgLst>
-    <pc:chgData name="Wendi Fan" userId="S::wendi.fan@softwire.com::aa43677a-bbe8-4ac0-bfc8-43838de03ab4" providerId="AD" clId="Web-{997F4CA0-31C3-3461-53C9-704321DF8750}"/>
-    <pc:docChg chg="modSld">
-      <pc:chgData name="Wendi Fan" userId="S::wendi.fan@softwire.com::aa43677a-bbe8-4ac0-bfc8-43838de03ab4" providerId="AD" clId="Web-{997F4CA0-31C3-3461-53C9-704321DF8750}" dt="2025-02-14T12:53:32.258" v="447" actId="20577"/>
-      <pc:docMkLst>
-        <pc:docMk/>
-      </pc:docMkLst>
-      <pc:sldChg chg="addSp modSp">
-        <pc:chgData name="Wendi Fan" userId="S::wendi.fan@softwire.com::aa43677a-bbe8-4ac0-bfc8-43838de03ab4" providerId="AD" clId="Web-{997F4CA0-31C3-3461-53C9-704321DF8750}" dt="2025-02-14T12:53:32.258" v="447" actId="20577"/>
-        <pc:sldMkLst>
-          <pc:docMk/>
-          <pc:sldMk cId="432697297" sldId="4538"/>
-        </pc:sldMkLst>
-      </pc:sldChg>
-    </pc:docChg>
-  </pc:docChgLst>
-  <pc:docChgLst>
-    <pc:chgData name="Carolyn Barker" userId="22add79f-bf68-47c2-9e7d-aef0e205ab6d" providerId="ADAL" clId="{28540B9F-38D5-4CF5-A90A-54EE27A1F772}"/>
-    <pc:docChg chg="undo redo custSel modSld">
-      <pc:chgData name="Carolyn Barker" userId="22add79f-bf68-47c2-9e7d-aef0e205ab6d" providerId="ADAL" clId="{28540B9F-38D5-4CF5-A90A-54EE27A1F772}" dt="2025-10-25T13:27:28.272" v="446" actId="6549"/>
-      <pc:docMkLst>
-        <pc:docMk/>
-      </pc:docMkLst>
-      <pc:sldChg chg="addSp delSp modSp mod">
-        <pc:chgData name="Carolyn Barker" userId="22add79f-bf68-47c2-9e7d-aef0e205ab6d" providerId="ADAL" clId="{28540B9F-38D5-4CF5-A90A-54EE27A1F772}" dt="2025-10-25T13:27:28.272" v="446" actId="6549"/>
-        <pc:sldMkLst>
-          <pc:docMk/>
-          <pc:sldMk cId="432697297" sldId="4538"/>
-        </pc:sldMkLst>
-        <pc:spChg chg="mod">
-          <ac:chgData name="Carolyn Barker" userId="22add79f-bf68-47c2-9e7d-aef0e205ab6d" providerId="ADAL" clId="{28540B9F-38D5-4CF5-A90A-54EE27A1F772}" dt="2025-10-25T13:27:28.272" v="446" actId="6549"/>
-          <ac:spMkLst>
-            <pc:docMk/>
-            <pc:sldMk cId="432697297" sldId="4538"/>
-            <ac:spMk id="6" creationId="{023AE65F-D67E-8443-FB37-CFF5773DE671}"/>
-          </ac:spMkLst>
-        </pc:spChg>
-        <pc:picChg chg="add del mod">
-          <ac:chgData name="Carolyn Barker" userId="22add79f-bf68-47c2-9e7d-aef0e205ab6d" providerId="ADAL" clId="{28540B9F-38D5-4CF5-A90A-54EE27A1F772}" dt="2025-10-25T13:26:35.369" v="382" actId="478"/>
-          <ac:picMkLst>
-            <pc:docMk/>
-            <pc:sldMk cId="432697297" sldId="4538"/>
-            <ac:picMk id="3" creationId="{61C86583-12C9-80C6-8B69-5C7EF9849F1F}"/>
-          </ac:picMkLst>
-        </pc:picChg>
-        <pc:picChg chg="add mod">
-          <ac:chgData name="Carolyn Barker" userId="22add79f-bf68-47c2-9e7d-aef0e205ab6d" providerId="ADAL" clId="{28540B9F-38D5-4CF5-A90A-54EE27A1F772}" dt="2025-10-24T18:16:48.103" v="348"/>
-          <ac:picMkLst>
-            <pc:docMk/>
-            <pc:sldMk cId="432697297" sldId="4538"/>
-            <ac:picMk id="8" creationId="{045324B0-854F-2ACA-9000-F4919BADF50A}"/>
-          </ac:picMkLst>
-        </pc:picChg>
-        <pc:picChg chg="add mod">
-          <ac:chgData name="Carolyn Barker" userId="22add79f-bf68-47c2-9e7d-aef0e205ab6d" providerId="ADAL" clId="{28540B9F-38D5-4CF5-A90A-54EE27A1F772}" dt="2025-10-24T18:12:01.906" v="339" actId="1076"/>
-          <ac:picMkLst>
-            <pc:docMk/>
-            <pc:sldMk cId="432697297" sldId="4538"/>
-            <ac:picMk id="1026" creationId="{B4307F24-E0BA-22AD-069C-E15D5E5674B6}"/>
-          </ac:picMkLst>
-        </pc:picChg>
-      </pc:sldChg>
-    </pc:docChg>
-  </pc:docChgLst>
 </pc:chgInfo>
 </file>
 
@@ -591,7 +591,7 @@
           <a:p>
             <a:fld id="{78B2772D-67CF-446E-AB14-873D70346968}" type="datetimeFigureOut">
               <a:rPr lang="en-GB" smtClean="0"/>
-              <a:t>24/10/2025</a:t>
+              <a:t>27/10/2025</a:t>
             </a:fld>
             <a:endParaRPr lang="en-GB"/>
           </a:p>
@@ -3146,7 +3146,7 @@
           <a:p>
             <a:fld id="{6C25FA03-981D-3F4F-ABFD-F2CAE44CF4DF}" type="datetime1">
               <a:rPr lang="en-GB" smtClean="0"/>
-              <a:t>24/10/2025</a:t>
+              <a:t>27/10/2025</a:t>
             </a:fld>
             <a:endParaRPr lang="en-GB"/>
           </a:p>
@@ -3466,7 +3466,7 @@
           <a:p>
             <a:fld id="{AD447513-F0D7-9140-9852-9A843D8B81D3}" type="datetime1">
               <a:rPr lang="en-GB" smtClean="0"/>
-              <a:t>24/10/2025</a:t>
+              <a:t>27/10/2025</a:t>
             </a:fld>
             <a:endParaRPr lang="en-GB"/>
           </a:p>
@@ -3879,7 +3879,7 @@
           <a:p>
             <a:fld id="{4FC983D9-AEB3-884A-8B61-40B359253CCD}" type="datetime1">
               <a:rPr lang="en-GB" smtClean="0"/>
-              <a:t>24/10/2025</a:t>
+              <a:t>27/10/2025</a:t>
             </a:fld>
             <a:endParaRPr lang="en-GB"/>
           </a:p>
@@ -4914,7 +4914,7 @@
           <a:p>
             <a:fld id="{862EF5BF-54FA-BF48-B61D-2432192EF666}" type="datetime1">
               <a:rPr lang="en-GB" smtClean="0"/>
-              <a:t>24/10/2025</a:t>
+              <a:t>27/10/2025</a:t>
             </a:fld>
             <a:endParaRPr lang="en-GB"/>
           </a:p>
@@ -8033,7 +8033,7 @@
           <a:p>
             <a:fld id="{08B972FC-9C63-1B41-803B-B958A5F6CE25}" type="datetime1">
               <a:rPr lang="en-GB" smtClean="0"/>
-              <a:t>24/10/2025</a:t>
+              <a:t>27/10/2025</a:t>
             </a:fld>
             <a:endParaRPr lang="en-GB"/>
           </a:p>
@@ -8161,7 +8161,7 @@
           <a:p>
             <a:fld id="{05210873-7FD8-1244-ABA1-499AC4AF712B}" type="datetime1">
               <a:rPr lang="en-GB" smtClean="0"/>
-              <a:t>24/10/2025</a:t>
+              <a:t>27/10/2025</a:t>
             </a:fld>
             <a:endParaRPr lang="en-GB"/>
           </a:p>
@@ -8391,7 +8391,7 @@
           <a:p>
             <a:fld id="{5075CE0D-163E-D54F-96AD-C92D6F353048}" type="datetime1">
               <a:rPr lang="en-GB" smtClean="0"/>
-              <a:t>24/10/2025</a:t>
+              <a:t>27/10/2025</a:t>
             </a:fld>
             <a:endParaRPr lang="en-GB"/>
           </a:p>
@@ -11091,7 +11091,7 @@
           <a:p>
             <a:fld id="{330677AC-4808-7844-8878-C4DC36017FAF}" type="datetime1">
               <a:rPr lang="en-GB" smtClean="0"/>
-              <a:t>24/10/2025</a:t>
+              <a:t>27/10/2025</a:t>
             </a:fld>
             <a:endParaRPr lang="en-GB"/>
           </a:p>
@@ -11618,7 +11618,7 @@
           <a:p>
             <a:fld id="{05A8478A-EDB8-3145-A182-C5ED532937CD}" type="datetime1">
               <a:rPr lang="en-GB" smtClean="0"/>
-              <a:t>24/10/2025</a:t>
+              <a:t>27/10/2025</a:t>
             </a:fld>
             <a:endParaRPr lang="en-GB"/>
           </a:p>
@@ -11996,7 +11996,7 @@
           <a:p>
             <a:fld id="{3A861D55-4B75-6148-B497-8307DFA79D9F}" type="datetime1">
               <a:rPr lang="en-GB" smtClean="0"/>
-              <a:t>24/10/2025</a:t>
+              <a:t>27/10/2025</a:t>
             </a:fld>
             <a:endParaRPr lang="en-GB"/>
           </a:p>
@@ -12314,7 +12314,7 @@
           <a:p>
             <a:fld id="{23E27BC6-0B0F-3C48-A90A-106E7F9DC3AC}" type="datetime1">
               <a:rPr lang="en-GB" smtClean="0"/>
-              <a:t>24/10/2025</a:t>
+              <a:t>27/10/2025</a:t>
             </a:fld>
             <a:endParaRPr lang="en-GB"/>
           </a:p>
@@ -12696,7 +12696,7 @@
           <a:p>
             <a:fld id="{52156CEE-F6CC-7B46-8301-E62F55883839}" type="datetime1">
               <a:rPr lang="en-GB" smtClean="0"/>
-              <a:t>24/10/2025</a:t>
+              <a:t>27/10/2025</a:t>
             </a:fld>
             <a:endParaRPr lang="en-GB"/>
           </a:p>
@@ -13078,7 +13078,7 @@
           <a:p>
             <a:fld id="{F44621EF-E3B6-AC44-B311-3F80F8F520D1}" type="datetime1">
               <a:rPr lang="en-GB" smtClean="0"/>
-              <a:t>24/10/2025</a:t>
+              <a:t>27/10/2025</a:t>
             </a:fld>
             <a:endParaRPr lang="en-GB"/>
           </a:p>
@@ -13460,7 +13460,7 @@
           <a:p>
             <a:fld id="{D97C8151-BC5D-0342-B9A9-219468AF0BB5}" type="datetime1">
               <a:rPr lang="en-GB" smtClean="0"/>
-              <a:t>24/10/2025</a:t>
+              <a:t>27/10/2025</a:t>
             </a:fld>
             <a:endParaRPr lang="en-GB"/>
           </a:p>
@@ -13793,7 +13793,7 @@
           <a:p>
             <a:fld id="{31D05CA0-F179-1E48-8911-D48A170F3146}" type="datetime1">
               <a:rPr lang="en-GB" smtClean="0"/>
-              <a:t>24/10/2025</a:t>
+              <a:t>27/10/2025</a:t>
             </a:fld>
             <a:endParaRPr lang="en-GB"/>
           </a:p>
@@ -19537,13 +19537,14 @@
               <a:buChar char="•"/>
             </a:pPr>
             <a:r>
-              <a:rPr lang="en-GB" dirty="0" err="1"/>
-              <a:t>Qq</a:t>
+              <a:rPr lang="en-GB" b="1" dirty="0"/>
+              <a:t>Caz Yang </a:t>
             </a:r>
             <a:r>
               <a:rPr lang="en-GB" dirty="0"/>
-              <a:t> Caz bio slide</a:t>
-            </a:r>
+              <a:t>(they/them)</a:t>
+            </a:r>
+            <a:endParaRPr lang="en-GB" b="1" dirty="0"/>
           </a:p>
           <a:p>
             <a:pPr marL="285750" indent="-285750">
@@ -19554,12 +19555,36 @@
               <a:buChar char="•"/>
             </a:pPr>
             <a:r>
-              <a:rPr lang="en-GB" dirty="0" err="1"/>
-              <a:t>Xak</a:t>
-            </a:r>
-            <a:r>
               <a:rPr lang="en-GB" dirty="0"/>
-              <a:t> Sen</a:t>
+              <a:t>studied </a:t>
+            </a:r>
+            <a:r>
+              <a:rPr lang="en-GB" b="1" dirty="0"/>
+              <a:t>Physics </a:t>
+            </a:r>
+            <a:r>
+              <a:rPr lang="en-GB" dirty="0"/>
+              <a:t>at </a:t>
+            </a:r>
+            <a:r>
+              <a:rPr lang="en-GB" b="1" dirty="0"/>
+              <a:t>Imperial College London</a:t>
+            </a:r>
+            <a:r>
+              <a:rPr lang="en-GB" dirty="0"/>
+              <a:t>, then </a:t>
+            </a:r>
+            <a:r>
+              <a:rPr lang="en-GB" b="1" dirty="0"/>
+              <a:t>Computer Science </a:t>
+            </a:r>
+            <a:r>
+              <a:rPr lang="en-GB" dirty="0"/>
+              <a:t>at </a:t>
+            </a:r>
+            <a:r>
+              <a:rPr lang="en-GB" b="1" dirty="0"/>
+              <a:t>UCL</a:t>
             </a:r>
           </a:p>
           <a:p>
@@ -19572,7 +19597,23 @@
             </a:pPr>
             <a:r>
               <a:rPr lang="en-GB" dirty="0"/>
-              <a:t>Studied Aerospace Engineering at the University of Bath where I worked at Amazon &amp; Rolls-Royce whilst completing my Masters degree</a:t>
+              <a:t>~9 years as a secondary school </a:t>
+            </a:r>
+            <a:r>
+              <a:rPr lang="en-GB" b="1" dirty="0"/>
+              <a:t>Physics </a:t>
+            </a:r>
+            <a:r>
+              <a:rPr lang="en-GB" dirty="0"/>
+              <a:t>and </a:t>
+            </a:r>
+            <a:r>
+              <a:rPr lang="en-GB" b="1" dirty="0"/>
+              <a:t>Computer Science teacher</a:t>
+            </a:r>
+            <a:r>
+              <a:rPr lang="en-GB" dirty="0"/>
+              <a:t> (at The Henrietta Barnett School and King’s Maths School)</a:t>
             </a:r>
           </a:p>
           <a:p>
@@ -19585,8 +19626,25 @@
             </a:pPr>
             <a:r>
               <a:rPr lang="en-GB" dirty="0"/>
-              <a:t>Self taught through online courses &amp; hobby programming (C++, Python, HTML, MATLAB)</a:t>
-            </a:r>
+              <a:t>did some random tech jobs here and there at </a:t>
+            </a:r>
+            <a:r>
+              <a:rPr lang="en-GB" b="1" dirty="0"/>
+              <a:t>Hack Partners </a:t>
+            </a:r>
+            <a:r>
+              <a:rPr lang="en-GB" dirty="0"/>
+              <a:t>(running hackathons) and </a:t>
+            </a:r>
+            <a:r>
+              <a:rPr lang="en-GB" b="1" dirty="0"/>
+              <a:t>Bombardier Transportation</a:t>
+            </a:r>
+            <a:r>
+              <a:rPr lang="en-GB" dirty="0"/>
+              <a:t> (setting up new digital systems at a railway depot)</a:t>
+            </a:r>
+            <a:endParaRPr lang="en-GB" b="1" dirty="0"/>
           </a:p>
           <a:p>
             <a:pPr marL="285750" indent="-285750">
@@ -19598,7 +19656,43 @@
             </a:pPr>
             <a:r>
               <a:rPr lang="en-GB" dirty="0"/>
-              <a:t>Pivoted to Software Engineering</a:t>
+              <a:t>started at </a:t>
+            </a:r>
+            <a:r>
+              <a:rPr lang="en-GB" b="1" dirty="0"/>
+              <a:t>Softwire</a:t>
+            </a:r>
+            <a:r>
+              <a:rPr lang="en-GB" dirty="0"/>
+              <a:t> in </a:t>
+            </a:r>
+            <a:r>
+              <a:rPr lang="en-GB" b="1" dirty="0"/>
+              <a:t>April 2025</a:t>
+            </a:r>
+            <a:r>
+              <a:rPr lang="en-GB" dirty="0"/>
+              <a:t>, worked on two projects: </a:t>
+            </a:r>
+            <a:r>
+              <a:rPr lang="en-GB" b="1" dirty="0" err="1"/>
+              <a:t>Elexon</a:t>
+            </a:r>
+            <a:r>
+              <a:rPr lang="en-GB" b="1" dirty="0"/>
+              <a:t>/EMRS</a:t>
+            </a:r>
+            <a:r>
+              <a:rPr lang="en-GB" dirty="0"/>
+              <a:t> (energy &amp; utilities) and </a:t>
+            </a:r>
+            <a:r>
+              <a:rPr lang="en-GB" b="1" dirty="0"/>
+              <a:t>CUPA</a:t>
+            </a:r>
+            <a:r>
+              <a:rPr lang="en-GB" dirty="0"/>
+              <a:t> (examinations and assessments)</a:t>
             </a:r>
           </a:p>
           <a:p>
@@ -19611,52 +19705,8 @@
             </a:pPr>
             <a:r>
               <a:rPr lang="en-GB" dirty="0"/>
-              <a:t>Started at Softwire in September 2024 – no professional coding experience at the time</a:t>
-            </a:r>
-          </a:p>
-          <a:p>
-            <a:pPr marL="285750" indent="-285750">
-              <a:lnSpc>
-                <a:spcPct val="90000"/>
-              </a:lnSpc>
-              <a:buFont typeface="Arial" panose="020B0604020202020204" pitchFamily="34" charset="0"/>
-              <a:buChar char="•"/>
-            </a:pPr>
-            <a:r>
-              <a:rPr lang="en-GB" dirty="0"/>
-              <a:t>I’ve worked on Channel 5 &amp; </a:t>
-            </a:r>
-            <a:r>
-              <a:rPr lang="en-GB" dirty="0" err="1"/>
-              <a:t>Elexon</a:t>
-            </a:r>
-            <a:r>
-              <a:rPr lang="en-GB" dirty="0"/>
-              <a:t> projects since joining (React, .NET, Ruby on Rails)</a:t>
-            </a:r>
-          </a:p>
-          <a:p>
-            <a:pPr marL="285750" indent="-285750">
-              <a:lnSpc>
-                <a:spcPct val="90000"/>
-              </a:lnSpc>
-              <a:buFont typeface="Arial" panose="020B0604020202020204" pitchFamily="34" charset="0"/>
-              <a:buChar char="•"/>
-            </a:pPr>
-            <a:r>
-              <a:rPr lang="en-GB" dirty="0"/>
-              <a:t>Outside of work, I spend most of my time playing football, pool, travelling abroad, chess, FPS games &amp; board games</a:t>
-            </a:r>
-          </a:p>
-          <a:p>
-            <a:pPr marL="285750" indent="-285750">
-              <a:lnSpc>
-                <a:spcPct val="90000"/>
-              </a:lnSpc>
-              <a:buFont typeface="Arial" panose="020B0604020202020204" pitchFamily="34" charset="0"/>
-              <a:buChar char="•"/>
-            </a:pPr>
-            <a:endParaRPr lang="en-GB" dirty="0"/>
+              <a:t>I like video games, board games, escape rooms, anime, basically loads of nerdy things :]</a:t>
+            </a:r>
           </a:p>
         </p:txBody>
       </p:sp>
@@ -19746,44 +19796,6 @@
           </a:p>
         </p:txBody>
       </p:sp>
-      <p:pic>
-        <p:nvPicPr>
-          <p:cNvPr id="1026" name="Picture 2" descr="Profile photo for Xak Sen">
-            <a:extLst>
-              <a:ext uri="{FF2B5EF4-FFF2-40B4-BE49-F238E27FC236}">
-                <a16:creationId xmlns:a16="http://schemas.microsoft.com/office/drawing/2014/main" id="{B378CE3D-BF20-D3F8-295D-7CB3A7E2B0C7}"/>
-              </a:ext>
-            </a:extLst>
-          </p:cNvPr>
-          <p:cNvPicPr>
-            <a:picLocks noChangeAspect="1" noChangeArrowheads="1"/>
-          </p:cNvPicPr>
-          <p:nvPr/>
-        </p:nvPicPr>
-        <p:blipFill>
-          <a:blip r:embed="rId3">
-            <a:extLst>
-              <a:ext uri="{28A0092B-C50C-407E-A947-70E740481C1C}">
-                <a14:useLocalDpi xmlns:a14="http://schemas.microsoft.com/office/drawing/2010/main" val="0"/>
-              </a:ext>
-            </a:extLst>
-          </a:blip>
-          <a:srcRect r="11111"/>
-          <a:stretch/>
-        </p:blipFill>
-        <p:spPr bwMode="auto">
-          <a:xfrm>
-            <a:off x="6096000" y="10"/>
-            <a:ext cx="6096000" cy="6857990"/>
-          </a:xfrm>
-          <a:prstGeom prst="rect">
-            <a:avLst/>
-          </a:prstGeom>
-          <a:solidFill>
-            <a:srgbClr val="FFFFFF"/>
-          </a:solidFill>
-        </p:spPr>
-      </p:pic>
     </p:spTree>
     <p:extLst>
       <p:ext uri="{BB962C8B-B14F-4D97-AF65-F5344CB8AC3E}">
@@ -19979,21 +19991,8 @@
             </a:pPr>
             <a:r>
               <a:rPr lang="en-GB" dirty="0"/>
-              <a:t>Outside of work, I enjoy crosswords, quizzing</a:t>
-            </a:r>
-            <a:r>
-              <a:rPr lang="en-GB"/>
-              <a:t>,  </a:t>
-            </a:r>
-            <a:r>
-              <a:rPr lang="en-GB" dirty="0"/>
-              <a:t>jiu jitsu, astronomy, watching formula 1, </a:t>
-            </a:r>
-            <a:r>
-              <a:rPr lang="en-GB"/>
-              <a:t>traveling abroad</a:t>
-            </a:r>
-            <a:endParaRPr lang="en-GB" dirty="0"/>
+              <a:t>Outside of work, I enjoy crosswords, quizzing,  jiu jitsu, astronomy, watching formula 1, traveling abroad</a:t>
+            </a:r>
           </a:p>
           <a:p>
             <a:pPr marL="285750" indent="-285750">
@@ -20197,10 +20196,10 @@
           <a:lstStyle/>
           <a:p>
             <a:r>
-              <a:rPr lang="en-GB"/>
+              <a:rPr lang="en-GB" dirty="0"/>
               <a:t>Who are you?</a:t>
             </a:r>
-            <a:endParaRPr lang="en-US"/>
+            <a:endParaRPr lang="en-US" dirty="0"/>
           </a:p>
         </p:txBody>
       </p:sp>
@@ -20298,7 +20297,7 @@
             </a:pPr>
             <a:r>
               <a:rPr lang="en-GB" dirty="0"/>
-              <a:t>Do you require any special accommodations to be comfortable this week? </a:t>
+              <a:t>Do you require any special accommodations to be comfortable this week?</a:t>
             </a:r>
           </a:p>
           <a:p>

</xml_diff>